<commit_message>
modified pptx, wrong word
</commit_message>
<xml_diff>
--- a/cs semina/01SNN_LIF-Neural-1.pptx
+++ b/cs semina/01SNN_LIF-Neural-1.pptx
@@ -278,7 +278,7 @@
           <a:p>
             <a:fld id="{57764B8E-7EC0-4B59-8DA5-E04CAE3DB5F2}" type="datetimeFigureOut">
               <a:rPr lang="ko-KR" altLang="en-US" smtClean="0"/>
-              <a:t>2024-01-01</a:t>
+              <a:t>2024-01-03</a:t>
             </a:fld>
             <a:endParaRPr lang="ko-KR" altLang="en-US"/>
           </a:p>
@@ -5626,7 +5626,7 @@
             </a:r>
             <a:r>
               <a:rPr lang="ko-KR" altLang="en-US" sz="2000" dirty="0"/>
-              <a:t>누구</a:t>
+              <a:t>누수</a:t>
             </a:r>
             <a:r>
               <a:rPr lang="en-US" altLang="ko-KR" sz="2000" dirty="0"/>

</xml_diff>